<commit_message>
Update Github repo link
</commit_message>
<xml_diff>
--- a/docs/UX_explication.pptx
+++ b/docs/UX_explication.pptx
@@ -111,6 +111,11 @@
       </a:defRPr>
     </a:lvl9pPr>
   </p:defaultTextStyle>
+  <p:extLst>
+    <p:ext uri="{EFAFB233-063F-42B5-8137-9DF3F51BA10A}">
+      <p15:sldGuideLst xmlns:p15="http://schemas.microsoft.com/office/powerpoint/2012/main"/>
+    </p:ext>
+  </p:extLst>
 </p:presentation>
 </file>
 
@@ -6048,40 +6053,73 @@
               </a:rPr>
               <a:t>seb.lhoumeau@gmail</a:t>
             </a:r>
+            <a:endParaRPr lang="fr-FR" sz="2000" dirty="0"/>
+          </a:p>
+          <a:p>
+            <a:pPr marL="0" indent="0">
+              <a:buNone/>
+            </a:pPr>
+            <a:endParaRPr lang="fr-FR" sz="2000" dirty="0"/>
+          </a:p>
+          <a:p>
+            <a:pPr marL="0" indent="0">
+              <a:buNone/>
+            </a:pPr>
+            <a:r>
+              <a:rPr lang="fr-FR" sz="2000" dirty="0">
+                <a:hlinkClick r:id="rId3"/>
+              </a:rPr>
+              <a:t>https://github.com/SebEyes</a:t>
+            </a:r>
             <a:r>
               <a:rPr lang="fr-FR" sz="2000" dirty="0"/>
+              <a:t>  </a:t>
+            </a:r>
+          </a:p>
+        </p:txBody>
+      </p:sp>
+      <p:sp>
+        <p:nvSpPr>
+          <p:cNvPr id="3" name="Content Placeholder 2">
+            <a:extLst>
+              <a:ext uri="{FF2B5EF4-FFF2-40B4-BE49-F238E27FC236}">
+                <a16:creationId xmlns:a16="http://schemas.microsoft.com/office/drawing/2014/main" id="{596D6D2B-4AF3-A24A-F394-51298B8730F3}"/>
+              </a:ext>
+            </a:extLst>
+          </p:cNvPr>
+          <p:cNvSpPr>
+            <a:spLocks noGrp="1"/>
+          </p:cNvSpPr>
+          <p:nvPr>
+            <p:ph sz="half" idx="2"/>
+          </p:nvPr>
+        </p:nvSpPr>
+        <p:spPr/>
+        <p:txBody>
+          <a:bodyPr/>
+          <a:lstStyle/>
+          <a:p>
+            <a:pPr marL="0" indent="0">
+              <a:buNone/>
+            </a:pPr>
+            <a:r>
+              <a:rPr lang="fr-FR" dirty="0"/>
+              <a:t>Code source disponible sur le dépôt GitHub:</a:t>
+            </a:r>
+          </a:p>
+          <a:p>
+            <a:pPr marL="0" indent="0">
+              <a:buNone/>
+            </a:pPr>
+            <a:r>
+              <a:rPr lang="fr-FR" sz="2400" dirty="0">
+                <a:hlinkClick r:id="rId4"/>
+              </a:rPr>
+              <a:t>https://github.com/SebEyes/ReefWarmMonitor</a:t>
+            </a:r>
+            <a:r>
+              <a:rPr lang="fr-FR" sz="2400" dirty="0"/>
               <a:t> </a:t>
-            </a:r>
-          </a:p>
-        </p:txBody>
-      </p:sp>
-      <p:sp>
-        <p:nvSpPr>
-          <p:cNvPr id="3" name="Content Placeholder 2">
-            <a:extLst>
-              <a:ext uri="{FF2B5EF4-FFF2-40B4-BE49-F238E27FC236}">
-                <a16:creationId xmlns:a16="http://schemas.microsoft.com/office/drawing/2014/main" id="{596D6D2B-4AF3-A24A-F394-51298B8730F3}"/>
-              </a:ext>
-            </a:extLst>
-          </p:cNvPr>
-          <p:cNvSpPr>
-            <a:spLocks noGrp="1"/>
-          </p:cNvSpPr>
-          <p:nvPr>
-            <p:ph sz="half" idx="2"/>
-          </p:nvPr>
-        </p:nvSpPr>
-        <p:spPr/>
-        <p:txBody>
-          <a:bodyPr/>
-          <a:lstStyle/>
-          <a:p>
-            <a:pPr marL="0" indent="0">
-              <a:buNone/>
-            </a:pPr>
-            <a:r>
-              <a:rPr lang="fr-FR" dirty="0"/>
-              <a:t>Code source disponible sur le dépôt GitHub</a:t>
             </a:r>
           </a:p>
         </p:txBody>

</xml_diff>